<commit_message>
Updates Live Lecture 2 C00/D00
</commit_message>
<xml_diff>
--- a/lectures/lecture-02/Lecture-Live D00/Lecture 02 - Lecture.pptx
+++ b/lectures/lecture-02/Lecture-Live D00/Lecture 02 - Lecture.pptx
@@ -142,6 +142,294 @@
     </p:ext>
   </p:extLst>
 </p:presentation>
+</file>
+
+<file path=ppt/ink/ink1.xml><?xml version="1.0" encoding="utf-8"?>
+<inkml:ink xmlns:inkml="http://www.w3.org/2003/InkML">
+  <inkml:definitions>
+    <inkml:context xml:id="ctx0">
+      <inkml:inkSource xml:id="inkSrc0">
+        <inkml:traceFormat>
+          <inkml:channel name="X" type="integer" min="-2.14748E9" max="2.14748E9" units="cm"/>
+          <inkml:channel name="Y" type="integer" min="-2.14748E9" max="2.14748E9" units="cm"/>
+          <inkml:channel name="F" type="integer" max="32767" units="dev"/>
+          <inkml:channel name="OA" type="integer" max="360" units="deg"/>
+          <inkml:channel name="OE" type="integer" max="90" units="deg"/>
+        </inkml:traceFormat>
+        <inkml:channelProperties>
+          <inkml:channelProperty channel="X" name="resolution" value="1000" units="1/cm"/>
+          <inkml:channelProperty channel="Y" name="resolution" value="1000" units="1/cm"/>
+          <inkml:channelProperty channel="F" name="resolution" value="0" units="1/dev"/>
+          <inkml:channelProperty channel="OA" name="resolution" value="1000" units="1/deg"/>
+          <inkml:channelProperty channel="OE" name="resolution" value="1000" units="1/deg"/>
+        </inkml:channelProperties>
+      </inkml:inkSource>
+      <inkml:timestamp xml:id="ts0" timeString="2021-01-06T20:00:41.457"/>
+    </inkml:context>
+    <inkml:brush xml:id="br0">
+      <inkml:brushProperty name="width" value="0.05" units="cm"/>
+      <inkml:brushProperty name="height" value="0.05" units="cm"/>
+      <inkml:brushProperty name="color" value="#E71224"/>
+    </inkml:brush>
+  </inkml:definitions>
+  <inkml:trace contextRef="#ctx0" brushRef="#br0">58 1 10592 0 0,'-35'0'2587'0'0,"12"0"2073"0"0,44 7-3941 0 0,18 6-235 0 0,32 7 399 0 0,-41-13-655 0 0,12 3 356 0 0,0-1 1 0 0,75 4-1 0 0,132-11 310 0 0,171 9 1372 0 0,-264-6-1268 0 0,-44-2-584 0 0,175 1 1073 0 0,-211-5-1081 0 0,-10 3-142 0 0,35-2 320 0 0,24-1 564 0 0,-70 2-991 0 0,-35-1-146 0 0,39 5 0 0 0,-59-5-18 0 0,0-1 1 0 0,1 1-1 0 0,-1 0 1 0 0,0 0-1 0 0,0 0 0 0 0,0 0 1 0 0,1 0-1 0 0,-1 0 1 0 0,0 0-1 0 0,0-1 1 0 0,0 1-1 0 0,0 0 1 0 0,1 0-1 0 0,-1 0 1 0 0,0 0-1 0 0,0-1 0 0 0,0 1 1 0 0,0 0-1 0 0,0 0 1 0 0,0 0-1 0 0,0-1 1 0 0,0 1-1 0 0,1 0 1 0 0,-1 0-1 0 0,0 0 1 0 0,0-1-1 0 0,0 1 0 0 0,0 0 1 0 0,0 0-1 0 0,0-1 1 0 0,0 1-1 0 0,0 0 1 0 0,0 0-1 0 0,0 0 1 0 0,-1-1-1 0 0,1 1 1 0 0,0 0-1 0 0,0 0 0 0 0,0 0 1 0 0,0-1-1 0 0,0 1 1 0 0,0 0-1 0 0,0 0 1 0 0,0 0-1 0 0,-1 0 1 0 0,1-1-1 0 0,0 1 1 0 0,0 0-1 0 0,-5-11-2251 0 0,2 6 841 0 0,1 3-14 0 0</inkml:trace>
+</inkml:ink>
+</file>
+
+<file path=ppt/ink/ink2.xml><?xml version="1.0" encoding="utf-8"?>
+<inkml:ink xmlns:inkml="http://www.w3.org/2003/InkML">
+  <inkml:definitions>
+    <inkml:context xml:id="ctx0">
+      <inkml:inkSource xml:id="inkSrc0">
+        <inkml:traceFormat>
+          <inkml:channel name="X" type="integer" min="-2.14748E9" max="2.14748E9" units="cm"/>
+          <inkml:channel name="Y" type="integer" min="-2.14748E9" max="2.14748E9" units="cm"/>
+          <inkml:channel name="F" type="integer" max="32767" units="dev"/>
+          <inkml:channel name="OA" type="integer" max="360" units="deg"/>
+          <inkml:channel name="OE" type="integer" max="90" units="deg"/>
+        </inkml:traceFormat>
+        <inkml:channelProperties>
+          <inkml:channelProperty channel="X" name="resolution" value="1000" units="1/cm"/>
+          <inkml:channelProperty channel="Y" name="resolution" value="1000" units="1/cm"/>
+          <inkml:channelProperty channel="F" name="resolution" value="0" units="1/dev"/>
+          <inkml:channelProperty channel="OA" name="resolution" value="1000" units="1/deg"/>
+          <inkml:channelProperty channel="OE" name="resolution" value="1000" units="1/deg"/>
+        </inkml:channelProperties>
+      </inkml:inkSource>
+      <inkml:timestamp xml:id="ts0" timeString="2021-01-06T20:00:43.386"/>
+    </inkml:context>
+    <inkml:brush xml:id="br0">
+      <inkml:brushProperty name="width" value="0.05" units="cm"/>
+      <inkml:brushProperty name="height" value="0.05" units="cm"/>
+      <inkml:brushProperty name="color" value="#E71224"/>
+    </inkml:brush>
+  </inkml:definitions>
+  <inkml:trace contextRef="#ctx0" brushRef="#br0">0 58 14744 0 0,'0'0'1136'0'0,"12"2"195"0"0,51 12 4254 0 0,-44-11-4584 0 0,0-1-1 0 0,38 0 1 0 0,38-8 200 0 0,105-21-1 0 0,-68 8-451 0 0,1 6 1 0 0,222 7-1 0 0,-129 6-229 0 0,-224 0-507 0 0,0 0 0 0 0,0 0 0 0 0,0-1 0 0 0,1 1 0 0 0,-1 0 0 0 0,0-1 0 0 0,0 0 0 0 0,3 0 0 0 0,8-4 51 0 0,-12 5-172 0 0</inkml:trace>
+</inkml:ink>
+</file>
+
+<file path=ppt/ink/ink3.xml><?xml version="1.0" encoding="utf-8"?>
+<inkml:ink xmlns:inkml="http://www.w3.org/2003/InkML">
+  <inkml:definitions>
+    <inkml:context xml:id="ctx0">
+      <inkml:inkSource xml:id="inkSrc0">
+        <inkml:traceFormat>
+          <inkml:channel name="X" type="integer" min="-2.14748E9" max="2.14748E9" units="cm"/>
+          <inkml:channel name="Y" type="integer" min="-2.14748E9" max="2.14748E9" units="cm"/>
+          <inkml:channel name="F" type="integer" max="32767" units="dev"/>
+          <inkml:channel name="OA" type="integer" max="360" units="deg"/>
+          <inkml:channel name="OE" type="integer" max="90" units="deg"/>
+        </inkml:traceFormat>
+        <inkml:channelProperties>
+          <inkml:channelProperty channel="X" name="resolution" value="1000" units="1/cm"/>
+          <inkml:channelProperty channel="Y" name="resolution" value="1000" units="1/cm"/>
+          <inkml:channelProperty channel="F" name="resolution" value="0" units="1/dev"/>
+          <inkml:channelProperty channel="OA" name="resolution" value="1000" units="1/deg"/>
+          <inkml:channelProperty channel="OE" name="resolution" value="1000" units="1/deg"/>
+        </inkml:channelProperties>
+      </inkml:inkSource>
+      <inkml:timestamp xml:id="ts0" timeString="2021-01-06T20:00:45.809"/>
+    </inkml:context>
+    <inkml:brush xml:id="br0">
+      <inkml:brushProperty name="width" value="0.05" units="cm"/>
+      <inkml:brushProperty name="height" value="0.05" units="cm"/>
+      <inkml:brushProperty name="color" value="#E71224"/>
+    </inkml:brush>
+  </inkml:definitions>
+  <inkml:trace contextRef="#ctx0" brushRef="#br0">75 50 12640 0 0,'-13'4'779'0'0,"-25"7"-413"0"0,36-11 230 0 0,0 0 0 0 0,0 0 0 0 0,-1 0 0 0 0,1 0 0 0 0,0 0 1 0 0,-1 0-1 0 0,1-1 0 0 0,-3 0 0 0 0,29 7 248 0 0,0-1 0 0 0,0-1 1 0 0,44 1-1 0 0,-19-2-212 0 0,688 9 3095 0 0,-230-46-2311 0 0,-168 8-86 0 0,47 13-414 0 0,-290 13-609 0 0,-84-2-296 0 0,-12 2-15 0 0,0 0 1 0 0,1 0-1 0 0,-1 0 0 0 0,0 0 1 0 0,0 0-1 0 0,0 0 1 0 0,0 0-1 0 0,1 0 0 0 0,-1 0 1 0 0,0 0-1 0 0,0 0 1 0 0,0 0-1 0 0,0 0 0 0 0,1-1 1 0 0,-1 1-1 0 0,0 0 1 0 0,0 0-1 0 0,0 0 0 0 0,0 0 1 0 0,0 0-1 0 0,0 0 1 0 0,1-1-1 0 0,-1 1 0 0 0,0 0 1 0 0,0 0-1 0 0,0 0 1 0 0,0 0-1 0 0,0-1 0 0 0,0 1 1 0 0,0 0-1 0 0,0 0 1 0 0,0 0-1 0 0,0 0 0 0 0,0-1 1 0 0,0 1-1 0 0,0 0 1 0 0,0 0-1 0 0,0 0 0 0 0,0-1 1 0 0,0 1-1 0 0,0 0 1 0 0,0 0-1 0 0,0 0 0 0 0,0 0 1 0 0,0-1-1 0 0,0 1 1 0 0,0 0-1 0 0,0 0 0 0 0,0 0 1 0 0,-1 0-1 0 0,1-1 1 0 0,0 1-1 0 0,-6-7-918 0 0,6 6 764 0 0,-8-7-1342 0 0</inkml:trace>
+</inkml:ink>
+</file>
+
+<file path=ppt/ink/ink4.xml><?xml version="1.0" encoding="utf-8"?>
+<inkml:ink xmlns:inkml="http://www.w3.org/2003/InkML">
+  <inkml:definitions>
+    <inkml:context xml:id="ctx0">
+      <inkml:inkSource xml:id="inkSrc0">
+        <inkml:traceFormat>
+          <inkml:channel name="X" type="integer" min="-2.14748E9" max="2.14748E9" units="cm"/>
+          <inkml:channel name="Y" type="integer" min="-2.14748E9" max="2.14748E9" units="cm"/>
+          <inkml:channel name="F" type="integer" max="32767" units="dev"/>
+          <inkml:channel name="OA" type="integer" max="360" units="deg"/>
+          <inkml:channel name="OE" type="integer" max="90" units="deg"/>
+        </inkml:traceFormat>
+        <inkml:channelProperties>
+          <inkml:channelProperty channel="X" name="resolution" value="1000" units="1/cm"/>
+          <inkml:channelProperty channel="Y" name="resolution" value="1000" units="1/cm"/>
+          <inkml:channelProperty channel="F" name="resolution" value="0" units="1/dev"/>
+          <inkml:channelProperty channel="OA" name="resolution" value="1000" units="1/deg"/>
+          <inkml:channelProperty channel="OE" name="resolution" value="1000" units="1/deg"/>
+        </inkml:channelProperties>
+      </inkml:inkSource>
+      <inkml:timestamp xml:id="ts0" timeString="2021-01-06T20:00:46.607"/>
+    </inkml:context>
+    <inkml:brush xml:id="br0">
+      <inkml:brushProperty name="width" value="0.05" units="cm"/>
+      <inkml:brushProperty name="height" value="0.05" units="cm"/>
+      <inkml:brushProperty name="color" value="#E71224"/>
+    </inkml:brush>
+  </inkml:definitions>
+  <inkml:trace contextRef="#ctx0" brushRef="#br0">263 95 1376 0 0,'-86'-4'573'0'0,"29"4"3036"0"0,14 1 1894 0 0,14 1-2724 0 0,23-1-1849 0 0,0-1 1 0 0,0 1-1 0 0,0-1 0 0 0,0 0 1 0 0,-11-2-1 0 0,45 4 4239 0 0,33-4-4071 0 0,-14-1-436 0 0,141-11 864 0 0,-107 7-1063 0 0,91-9 367 0 0,160-11 39 0 0,-211 21-595 0 0,273-4 265 0 0,-183 10-419 0 0,-205 1-136 0 0,0-1 0 0 0,-1 0 0 0 0,1-1 0 0 0,0 1 0 0 0,0-1 0 0 0,-1-1-1 0 0,1 1 1 0 0,7-4 0 0 0,-12 5-123 0 0,2-2-1662 0 0</inkml:trace>
+</inkml:ink>
+</file>
+
+<file path=ppt/ink/ink5.xml><?xml version="1.0" encoding="utf-8"?>
+<inkml:ink xmlns:inkml="http://www.w3.org/2003/InkML">
+  <inkml:definitions>
+    <inkml:context xml:id="ctx0">
+      <inkml:inkSource xml:id="inkSrc0">
+        <inkml:traceFormat>
+          <inkml:channel name="X" type="integer" min="-2.14748E9" max="2.14748E9" units="cm"/>
+          <inkml:channel name="Y" type="integer" min="-2.14748E9" max="2.14748E9" units="cm"/>
+          <inkml:channel name="F" type="integer" max="32767" units="dev"/>
+          <inkml:channel name="OA" type="integer" max="360" units="deg"/>
+          <inkml:channel name="OE" type="integer" max="90" units="deg"/>
+        </inkml:traceFormat>
+        <inkml:channelProperties>
+          <inkml:channelProperty channel="X" name="resolution" value="1000" units="1/cm"/>
+          <inkml:channelProperty channel="Y" name="resolution" value="1000" units="1/cm"/>
+          <inkml:channelProperty channel="F" name="resolution" value="0" units="1/dev"/>
+          <inkml:channelProperty channel="OA" name="resolution" value="1000" units="1/deg"/>
+          <inkml:channelProperty channel="OE" name="resolution" value="1000" units="1/deg"/>
+        </inkml:channelProperties>
+      </inkml:inkSource>
+      <inkml:timestamp xml:id="ts0" timeString="2021-01-06T20:00:50.197"/>
+    </inkml:context>
+    <inkml:brush xml:id="br0">
+      <inkml:brushProperty name="width" value="0.05" units="cm"/>
+      <inkml:brushProperty name="height" value="0.05" units="cm"/>
+      <inkml:brushProperty name="color" value="#E71224"/>
+    </inkml:brush>
+  </inkml:definitions>
+  <inkml:trace contextRef="#ctx0" brushRef="#br0">35 176 15664 0 0,'-17'-3'1571'0'0,"16"3"-1484"0"0,-1 0-1 0 0,1-1 0 0 0,0 1 0 0 0,0 0 1 0 0,0-1-1 0 0,0 1 0 0 0,0-1 0 0 0,0 1 0 0 0,0-1 1 0 0,0 0-1 0 0,0 1 0 0 0,0-1 0 0 0,0 0 1 0 0,-1-1-1 0 0,2 2-4 0 0,0-1 0 0 0,0 1 0 0 0,0 0 0 0 0,0 0 0 0 0,0-1 0 0 0,0 1 1 0 0,0 0-1 0 0,0 0 0 0 0,0-1 0 0 0,0 1 0 0 0,0 0 0 0 0,0-1 0 0 0,0 1 0 0 0,0 0 0 0 0,0 0 1 0 0,1-1-1 0 0,-1 1 0 0 0,0 0 0 0 0,0 0 0 0 0,0-1 0 0 0,0 1 0 0 0,0 0 0 0 0,1 0 0 0 0,-1-1 1 0 0,0 1-1 0 0,0 0 0 0 0,0 0 0 0 0,1 0 0 0 0,-1 0 0 0 0,0-1 0 0 0,0 1 0 0 0,1 0 0 0 0,-1 0 1 0 0,0 0-1 0 0,0 0 0 0 0,1 0 0 0 0,-1 0 0 0 0,0 0 0 0 0,0 0 0 0 0,1-1 0 0 0,14-3 255 0 0,0 1 0 0 0,0 0 0 0 0,0 1 0 0 0,17 0 0 0 0,-11 0 44 0 0,27 0 713 0 0,58 5 0 0 0,7 0 327 0 0,50-11-307 0 0,192-36 1 0 0,-260 27-838 0 0,32-6 97 0 0,-88 18-252 0 0,3-2-7 0 0,0 3 0 0 0,72 0-1 0 0,-111 5-106 0 0,3-1 11 0 0,0 0 0 0 0,0 0 0 0 0,0 0 0 0 0,-1 0-1 0 0,1-1 1 0 0,0 0 0 0 0,8-3 0 0 0,-12 4 234 0 0,-10-13-41 0 0,0 0-2688 0 0</inkml:trace>
+</inkml:ink>
+</file>
+
+<file path=ppt/ink/ink6.xml><?xml version="1.0" encoding="utf-8"?>
+<inkml:ink xmlns:inkml="http://www.w3.org/2003/InkML">
+  <inkml:definitions>
+    <inkml:context xml:id="ctx0">
+      <inkml:inkSource xml:id="inkSrc0">
+        <inkml:traceFormat>
+          <inkml:channel name="X" type="integer" min="-2.14748E9" max="2.14748E9" units="cm"/>
+          <inkml:channel name="Y" type="integer" min="-2.14748E9" max="2.14748E9" units="cm"/>
+          <inkml:channel name="F" type="integer" max="32767" units="dev"/>
+          <inkml:channel name="OA" type="integer" max="360" units="deg"/>
+          <inkml:channel name="OE" type="integer" max="90" units="deg"/>
+        </inkml:traceFormat>
+        <inkml:channelProperties>
+          <inkml:channelProperty channel="X" name="resolution" value="1000" units="1/cm"/>
+          <inkml:channelProperty channel="Y" name="resolution" value="1000" units="1/cm"/>
+          <inkml:channelProperty channel="F" name="resolution" value="0" units="1/dev"/>
+          <inkml:channelProperty channel="OA" name="resolution" value="1000" units="1/deg"/>
+          <inkml:channelProperty channel="OE" name="resolution" value="1000" units="1/deg"/>
+        </inkml:channelProperties>
+      </inkml:inkSource>
+      <inkml:timestamp xml:id="ts0" timeString="2021-01-06T20:00:53.501"/>
+    </inkml:context>
+    <inkml:brush xml:id="br0">
+      <inkml:brushProperty name="width" value="0.05" units="cm"/>
+      <inkml:brushProperty name="height" value="0.05" units="cm"/>
+      <inkml:brushProperty name="color" value="#E71224"/>
+    </inkml:brush>
+  </inkml:definitions>
+  <inkml:trace contextRef="#ctx0" brushRef="#br0">3 70 11344 0 0,'0'-13'857'0'0,"-1"-4"-478"0"0,0-1 342 0 0,3 6 6671 0 0,-2 11-7278 0 0,1 1 1 0 0,-1-1 0 0 0,1 0-1 0 0,-1 1 1 0 0,1-1 0 0 0,-1 1-1 0 0,1-1 1 0 0,-1 1 0 0 0,1-1-1 0 0,0 1 1 0 0,-1-1 0 0 0,1 1-1 0 0,0-1 1 0 0,0 1 0 0 0,-1 0-1 0 0,1-1 1 0 0,0 1 0 0 0,0 0-1 0 0,-1 0 1 0 0,1 0 0 0 0,0-1-1 0 0,0 1 1 0 0,0 0 0 0 0,0 0-1 0 0,21 2 1074 0 0,-20-2-1080 0 0,141 20 2640 0 0,1-3-1712 0 0,138 9 236 0 0,163-21-315 0 0,-85-32-209 0 0,-299 22-885 0 0,181-12 306 0 0,0 21 397 0 0,-207-1-520 0 0,0 1 1 0 0,-1 2 0 0 0,0 2-1 0 0,40 13 1 0 0,-66-17-2 0 0,1-1 1 0 0,0-1-1 0 0,0 0 0 0 0,17 2 1 0 0,-25-4-202 0 0,15-19-391 0 0,-14 14 464 0 0,0 0 1 0 0,0 0-1 0 0,6-8 0 0 0,7 10-6186 0 0,-9 5 4553 0 0</inkml:trace>
+</inkml:ink>
+</file>
+
+<file path=ppt/ink/ink7.xml><?xml version="1.0" encoding="utf-8"?>
+<inkml:ink xmlns:inkml="http://www.w3.org/2003/InkML">
+  <inkml:definitions>
+    <inkml:context xml:id="ctx0">
+      <inkml:inkSource xml:id="inkSrc0">
+        <inkml:traceFormat>
+          <inkml:channel name="X" type="integer" min="-2.14748E9" max="2.14748E9" units="cm"/>
+          <inkml:channel name="Y" type="integer" min="-2.14748E9" max="2.14748E9" units="cm"/>
+          <inkml:channel name="F" type="integer" max="32767" units="dev"/>
+          <inkml:channel name="OA" type="integer" max="360" units="deg"/>
+          <inkml:channel name="OE" type="integer" max="90" units="deg"/>
+        </inkml:traceFormat>
+        <inkml:channelProperties>
+          <inkml:channelProperty channel="X" name="resolution" value="1000" units="1/cm"/>
+          <inkml:channelProperty channel="Y" name="resolution" value="1000" units="1/cm"/>
+          <inkml:channelProperty channel="F" name="resolution" value="0" units="1/dev"/>
+          <inkml:channelProperty channel="OA" name="resolution" value="1000" units="1/deg"/>
+          <inkml:channelProperty channel="OE" name="resolution" value="1000" units="1/deg"/>
+        </inkml:channelProperties>
+      </inkml:inkSource>
+      <inkml:timestamp xml:id="ts0" timeString="2021-01-06T20:01:37.546"/>
+    </inkml:context>
+    <inkml:brush xml:id="br0">
+      <inkml:brushProperty name="width" value="0.05" units="cm"/>
+      <inkml:brushProperty name="height" value="0.05" units="cm"/>
+      <inkml:brushProperty name="color" value="#E71224"/>
+    </inkml:brush>
+  </inkml:definitions>
+  <inkml:trace contextRef="#ctx0" brushRef="#br0">70 209 8288 0 0,'0'0'756'0'0,"-6"-4"-608"0"0,-7-2 658 0 0,9 6-343 0 0,1-1 1 0 0,0 0-1 0 0,0-1 0 0 0,0 1 0 0 0,0-1 0 0 0,0 1 0 0 0,1-1 1 0 0,-1 0-1 0 0,0 0 0 0 0,1 0 0 0 0,-1 0 0 0 0,1 0 0 0 0,0-1 0 0 0,0 1 1 0 0,-3-5-1 0 0,4 6-343 0 0,1 1 1 0 0,-1-1-1 0 0,1 0 0 0 0,0 1 1 0 0,-1-1-1 0 0,1 0 0 0 0,0 1 1 0 0,-1-1-1 0 0,1 0 0 0 0,0 0 1 0 0,0 1-1 0 0,0-1 0 0 0,0 0 1 0 0,0 0-1 0 0,0 1 0 0 0,0-1 1 0 0,0 0-1 0 0,0 0 0 0 0,0 1 1 0 0,0-1-1 0 0,0 0 1 0 0,0 1-1 0 0,1-1 0 0 0,-1 0 1 0 0,0 0-1 0 0,0 1 0 0 0,1-1 1 0 0,-1 0-1 0 0,1 1 0 0 0,-1-1 1 0 0,0 1-1 0 0,1-1 0 0 0,-1 0 1 0 0,1 1-1 0 0,0-1 0 0 0,-1 1 1 0 0,1 0-1 0 0,-1-1 1 0 0,1 1-1 0 0,0-1 0 0 0,-1 1 1 0 0,1 0-1 0 0,1-1 0 0 0,2 0 256 0 0,1 0 0 0 0,0 0 0 0 0,0 0 0 0 0,-1 1-1 0 0,10-1 1 0 0,12 3-13 0 0,49 9 0 0 0,-46-6-129 0 0,30 3 588 0 0,104 1 0 0 0,-152-9-876 0 0,52-2-174 0 0,-56 1 334 0 0,1 0 0 0 0,-1 0 0 0 0,0-1 0 0 0,0 0 0 0 0,0 0 0 0 0,8-4 0 0 0,-20-7 54 0 0,-1 5-152 0 0,-1 0 1 0 0,1 1-1 0 0,-2 0 0 0 0,1 0 0 0 0,-1 0 0 0 0,1 1 1 0 0,-2 0-1 0 0,-11-6 0 0 0,-11-5 34 0 0,-35-12 1 0 0,56 25-42 0 0,3 1-1 0 0,-1-1 0 0 0,-1 1 0 0 0,-19-5 0 0 0,27 7 0 0 0,0 1 0 0 0,-1 0 0 0 0,1-1 0 0 0,-1 1 0 0 0,1 0 0 0 0,-1 0 0 0 0,1 0 0 0 0,-1 0 0 0 0,1 0 0 0 0,0 0 0 0 0,-1 0 0 0 0,1 1 0 0 0,-1-1 0 0 0,1 0 0 0 0,-1 1 0 0 0,1-1 0 0 0,0 1 0 0 0,-1 0 0 0 0,1-1 0 0 0,0 1 0 0 0,0 0 0 0 0,-1 0 0 0 0,1 0 0 0 0,0 0 0 0 0,0 0 0 0 0,-2 2 0 0 0,3 2 0 0 0,3-2 0 0 0,0 1 0 0 0,0-1 1 0 0,0 0-1 0 0,0 0 0 0 0,1 0 0 0 0,-1 0 0 0 0,1 0 1 0 0,-1-1-1 0 0,1 0 0 0 0,0 0 0 0 0,0 0 0 0 0,0 0 0 0 0,1-1 1 0 0,-1 1-1 0 0,0-1 0 0 0,0 0 0 0 0,1 0 0 0 0,5 0 0 0 0,3 0 54 0 0,0 0 0 0 0,0-1 0 0 0,0 0-1 0 0,26-5 1 0 0,26-9 189 0 0,22-3 90 0 0,-44 14-13 0 0,-43 4-310 0 0,0 0-1 0 0,1-1 1 0 0,-1 1-1 0 0,0 0 1 0 0,0 0 0 0 0,1 0-1 0 0,-1-1 1 0 0,0 1-1 0 0,0 0 1 0 0,0 0 0 0 0,0 0-1 0 0,0-1 1 0 0,0 1-1 0 0,0 1 1 0 0,-5 7 74 0 0,-1 0 0 0 0,0 0 0 0 0,0 0 0 0 0,0-1 0 0 0,-11 10 0 0 0,-1 2-36 0 0,-40 52 16 0 0,48-61-102 0 0,1 1 0 0 0,0 0 0 0 0,-9 18 0 0 0,15-27 11 0 0,3-3-113 0 0</inkml:trace>
+</inkml:ink>
+</file>
+
+<file path=ppt/ink/ink8.xml><?xml version="1.0" encoding="utf-8"?>
+<inkml:ink xmlns:inkml="http://www.w3.org/2003/InkML">
+  <inkml:definitions>
+    <inkml:context xml:id="ctx0">
+      <inkml:inkSource xml:id="inkSrc0">
+        <inkml:traceFormat>
+          <inkml:channel name="X" type="integer" min="-2.14748E9" max="2.14748E9" units="cm"/>
+          <inkml:channel name="Y" type="integer" min="-2.14748E9" max="2.14748E9" units="cm"/>
+          <inkml:channel name="F" type="integer" max="32767" units="dev"/>
+          <inkml:channel name="OA" type="integer" max="360" units="deg"/>
+          <inkml:channel name="OE" type="integer" max="90" units="deg"/>
+        </inkml:traceFormat>
+        <inkml:channelProperties>
+          <inkml:channelProperty channel="X" name="resolution" value="1000" units="1/cm"/>
+          <inkml:channelProperty channel="Y" name="resolution" value="1000" units="1/cm"/>
+          <inkml:channelProperty channel="F" name="resolution" value="0" units="1/dev"/>
+          <inkml:channelProperty channel="OA" name="resolution" value="1000" units="1/deg"/>
+          <inkml:channelProperty channel="OE" name="resolution" value="1000" units="1/deg"/>
+        </inkml:channelProperties>
+      </inkml:inkSource>
+      <inkml:timestamp xml:id="ts0" timeString="2021-01-06T20:01:51.119"/>
+    </inkml:context>
+    <inkml:brush xml:id="br0">
+      <inkml:brushProperty name="width" value="0.05" units="cm"/>
+      <inkml:brushProperty name="height" value="0.05" units="cm"/>
+      <inkml:brushProperty name="color" value="#E71224"/>
+    </inkml:brush>
+  </inkml:definitions>
+  <inkml:trace contextRef="#ctx0" brushRef="#br0">1 274 13824 0 0,'0'0'1388'0'0,"0"-1"-1276"0"0,1-1 12 0 0,-1 1 0 0 0,1-1 0 0 0,0 0 1 0 0,0 1-1 0 0,-1-1 0 0 0,1 1 1 0 0,1-1-1 0 0,-1 1 0 0 0,0-1 0 0 0,0 1 1 0 0,0 0-1 0 0,1 0 0 0 0,-1 0 1 0 0,1-1-1 0 0,-1 1 0 0 0,1 0 1 0 0,2-1-1 0 0,7-2 160 0 0,-1 0 0 0 0,0 0 0 0 0,1 1 1 0 0,0 1-1 0 0,0 0 0 0 0,17-2 0 0 0,-11 3 44 0 0,25-8 0 0 0,4-1 59 0 0,-29 7-198 0 0,-2-1 0 0 0,18-6-1 0 0,29-11 577 0 0,-9 4-201 0 0,-19 3-381 0 0,-30 12-211 0 0,7-5 522 0 0,-11 6-475 0 0,-1 1 0 0 0,1-1 0 0 0,0 1-1 0 0,0 0 1 0 0,0-1 0 0 0,0 1 0 0 0,0-1 0 0 0,0 1 0 0 0,0 0 0 0 0,-1-1 0 0 0,1 1 0 0 0,0 0 0 0 0,0-1 0 0 0,-1 1 0 0 0,1 0 0 0 0,0-1 0 0 0,0 1 0 0 0,-1 0 0 0 0,1 0 0 0 0,0-1 0 0 0,-1 1 0 0 0,1 0 0 0 0,0 0 0 0 0,-1-1 0 0 0,1 1 0 0 0,0 0 0 0 0,-1 0-1 0 0,1 0 1 0 0,-1 0 0 0 0,1 0 0 0 0,-1 0 0 0 0,-9-4 41 0 0,0 0-1 0 0,0 1 1 0 0,0 1 0 0 0,0 0-1 0 0,-17-1 1 0 0,-7-2-50 0 0,-190-35-318 0 0,219 39 424 0 0,0-1 0 0 0,0 0 0 0 0,0 0 0 0 0,0 0 0 0 0,1 0 0 0 0,-9-6 0 0 0,12 7 35 0 0,13-6-6 0 0,13 0-143 0 0,1 1 0 0 0,-1 1-1 0 0,40-2 1 0 0,-55 7 2 0 0,-5-1 2 0 0,-1 1 0 0 0,1 0 0 0 0,0 0 0 0 0,0 0 0 0 0,0 1 0 0 0,0 0 0 0 0,-1 0 0 0 0,1 0 0 0 0,0 1 1 0 0,8 3-1 0 0,-11-4 19 0 0,0 0 1 0 0,0 0 0 0 0,-1 0 0 0 0,1 1-1 0 0,0-1 1 0 0,0 1 0 0 0,-1-1 0 0 0,1 1-1 0 0,-1 0 1 0 0,1-1 0 0 0,-1 1 0 0 0,0 0-1 0 0,0 0 1 0 0,1 0 0 0 0,-1 0 0 0 0,-1 0-1 0 0,1 0 1 0 0,0 0 0 0 0,0 1 0 0 0,-1-1 0 0 0,1 0-1 0 0,-1 0 1 0 0,0 1 0 0 0,0 2 0 0 0,1 15 366 0 0,-1-13-355 0 0,1-1 0 0 0,-1 1-1 0 0,-1-1 1 0 0,1 1 0 0 0,-1-1 0 0 0,0 0-1 0 0,-2 8 1 0 0,-14 37 94 0 0,-6 18 40 0 0,17-57-147 0 0,1 0 0 0 0,1 0 1 0 0,0 1-1 0 0,1 0 0 0 0,0-1 1 0 0,-1 19-1 0 0,5-24-24 0 0,1-2-109 0 0,-1-4-59 0 0,0-1-1 0 0,0 1 1 0 0,0 0 0 0 0,0-1 0 0 0,0 1-1 0 0,0-1 1 0 0,0 1 0 0 0,0-1 0 0 0,0 0-1 0 0,0 1 1 0 0,0-1 0 0 0,0 0 0 0 0,0 0-1 0 0,0 0 1 0 0,1 0 0 0 0,-1 0 0 0 0,0 0-1 0 0,0 0 1 0 0,0 0 0 0 0,0 0 0 0 0,0 0-1 0 0,0-1 1 0 0,1 1 0 0 0,-1 0 0 0 0,1-2-1 0 0,9-2-1355 0 0</inkml:trace>
+</inkml:ink>
+</file>
+
+<file path=ppt/ink/ink9.xml><?xml version="1.0" encoding="utf-8"?>
+<inkml:ink xmlns:inkml="http://www.w3.org/2003/InkML">
+  <inkml:definitions>
+    <inkml:context xml:id="ctx0">
+      <inkml:inkSource xml:id="inkSrc0">
+        <inkml:traceFormat>
+          <inkml:channel name="X" type="integer" min="-2.14748E9" max="2.14748E9" units="cm"/>
+          <inkml:channel name="Y" type="integer" min="-2.14748E9" max="2.14748E9" units="cm"/>
+          <inkml:channel name="F" type="integer" max="32767" units="dev"/>
+          <inkml:channel name="OA" type="integer" max="360" units="deg"/>
+          <inkml:channel name="OE" type="integer" max="90" units="deg"/>
+        </inkml:traceFormat>
+        <inkml:channelProperties>
+          <inkml:channelProperty channel="X" name="resolution" value="1000" units="1/cm"/>
+          <inkml:channelProperty channel="Y" name="resolution" value="1000" units="1/cm"/>
+          <inkml:channelProperty channel="F" name="resolution" value="0" units="1/dev"/>
+          <inkml:channelProperty channel="OA" name="resolution" value="1000" units="1/deg"/>
+          <inkml:channelProperty channel="OE" name="resolution" value="1000" units="1/deg"/>
+        </inkml:channelProperties>
+      </inkml:inkSource>
+      <inkml:timestamp xml:id="ts0" timeString="2021-01-06T20:01:53.795"/>
+    </inkml:context>
+    <inkml:brush xml:id="br0">
+      <inkml:brushProperty name="width" value="0.05" units="cm"/>
+      <inkml:brushProperty name="height" value="0.05" units="cm"/>
+      <inkml:brushProperty name="color" value="#E71224"/>
+    </inkml:brush>
+  </inkml:definitions>
+  <inkml:trace contextRef="#ctx0" brushRef="#br0">41 266 5984 0 0,'-30'-7'3601'0'0,"20"3"1086"0"0,17 2-1179 0 0,21 1-1433 0 0,-26 1-2459 0 0,18-1 796 0 0,0-2 0 0 0,0 0 0 0 0,-1 0 0 0 0,1-2 0 0 0,21-8 0 0 0,-39 12-385 0 0,1 0 0 0 0,-1 0 1 0 0,0 0-1 0 0,0 0 0 0 0,0-1 0 0 0,1 1 0 0 0,-1-1 0 0 0,0 1 0 0 0,-1-1 0 0 0,1 0 0 0 0,0 1 0 0 0,0-1 0 0 0,-1 0 0 0 0,1 0 0 0 0,-1 0 0 0 0,0-1 0 0 0,1 1 0 0 0,-1 0 1 0 0,0 0-1 0 0,0-1 0 0 0,-1 1 0 0 0,1 0 0 0 0,0-1 0 0 0,-1 1 0 0 0,1-1 0 0 0,-1 1 0 0 0,0-1 0 0 0,0 1 0 0 0,0-1 0 0 0,0 1 0 0 0,0-1 0 0 0,-1 1 0 0 0,1-1 0 0 0,-1 1 1 0 0,0-1-1 0 0,1 1 0 0 0,-1 0 0 0 0,0-1 0 0 0,0 1 0 0 0,-1 0 0 0 0,1 0 0 0 0,0 0 0 0 0,-1 0 0 0 0,1 0 0 0 0,-1 0 0 0 0,-2-2 0 0 0,-1-1 111 0 0,0 0-163 0 0,0 0-1 0 0,-1 1 1 0 0,1-1 0 0 0,-1 1 0 0 0,0 0 0 0 0,0 0-1 0 0,-1 1 1 0 0,-10-5 0 0 0,15 7 50 0 0,1 1-1 0 0,-1-1 1 0 0,1 0 0 0 0,-1 0 0 0 0,1 0-1 0 0,-1 0 1 0 0,1 0 0 0 0,0 0-1 0 0,-1 0 1 0 0,1 0 0 0 0,0-1 0 0 0,-1-1-1 0 0,1 2 248 0 0,126-10 216 0 0,-81 6-346 0 0,-6-2-11 0 0,1 0 1 0 0,50-19-1 0 0,-71 21 25 0 0,-10 3-26 0 0,-8 2-127 0 0,0 0-1 0 0,0 0 1 0 0,-1 0-1 0 0,1 0 1 0 0,0 0-1 0 0,0 0 1 0 0,0 0-1 0 0,0 0 1 0 0,0 0-1 0 0,0 0 1 0 0,0 1-1 0 0,0-1 1 0 0,0 0-1 0 0,0 0 1 0 0,0 0-1 0 0,0 0 1 0 0,0 0 0 0 0,0 0-1 0 0,0 0 1 0 0,0 0-1 0 0,0 0 1 0 0,0 0-1 0 0,0 0 1 0 0,0 0-1 0 0,0 0 1 0 0,0 0-1 0 0,0 0 1 0 0,0 0-1 0 0,0 0 1 0 0,0 0-1 0 0,0 0 1 0 0,0 0-1 0 0,0 0 1 0 0,0 0 0 0 0,0 0-1 0 0,0 0 1 0 0,0 0-1 0 0,0 0 1 0 0,0 0-1 0 0,1 0 1 0 0,-1 1-1 0 0,-8 4 154 0 0,1 1-1 0 0,0 0 1 0 0,0 1-1 0 0,1 0 0 0 0,-6 7 1 0 0,-14 15-291 0 0,18-20 66 0 0,1 0 0 0 0,-1 0 0 0 0,-8 17 0 0 0,-2 1 123 0 0,4-7-23 0 0,-1 1-454 0 0,-15 26-1 0 0,22-37-1441 0 0</inkml:trace>
+</inkml:ink>
 </file>
 
 <file path=ppt/notesMasters/notesMaster1.xml><?xml version="1.0" encoding="utf-8"?>
@@ -4254,6 +4542,312 @@
           </a:p>
         </p:txBody>
       </p:sp>
+      <mc:AlternateContent xmlns:mc="http://schemas.openxmlformats.org/markup-compatibility/2006">
+        <mc:Choice xmlns:p14="http://schemas.microsoft.com/office/powerpoint/2010/main" Requires="p14">
+          <p:contentPart p14:bwMode="auto" r:id="rId2">
+            <p14:nvContentPartPr>
+              <p14:cNvPr id="4" name="Ink 3">
+                <a:extLst>
+                  <a:ext uri="{FF2B5EF4-FFF2-40B4-BE49-F238E27FC236}">
+                    <a16:creationId xmlns:a16="http://schemas.microsoft.com/office/drawing/2014/main" id="{D07F3585-5072-4D34-B6F1-2AC98CD5A111}"/>
+                  </a:ext>
+                </a:extLst>
+              </p14:cNvPr>
+              <p14:cNvContentPartPr/>
+              <p14:nvPr/>
+            </p14:nvContentPartPr>
+            <p14:xfrm>
+              <a:off x="741889" y="1757839"/>
+              <a:ext cx="753120" cy="39960"/>
+            </p14:xfrm>
+          </p:contentPart>
+        </mc:Choice>
+        <mc:Fallback>
+          <p:pic>
+            <p:nvPicPr>
+              <p:cNvPr id="4" name="Ink 3">
+                <a:extLst>
+                  <a:ext uri="{FF2B5EF4-FFF2-40B4-BE49-F238E27FC236}">
+                    <a16:creationId xmlns:a16="http://schemas.microsoft.com/office/drawing/2014/main" id="{D07F3585-5072-4D34-B6F1-2AC98CD5A111}"/>
+                  </a:ext>
+                </a:extLst>
+              </p:cNvPr>
+              <p:cNvPicPr/>
+              <p:nvPr/>
+            </p:nvPicPr>
+            <p:blipFill>
+              <a:blip r:embed="rId3"/>
+              <a:stretch>
+                <a:fillRect/>
+              </a:stretch>
+            </p:blipFill>
+            <p:spPr>
+              <a:xfrm>
+                <a:off x="732889" y="1749199"/>
+                <a:ext cx="770760" cy="57600"/>
+              </a:xfrm>
+              <a:prstGeom prst="rect">
+                <a:avLst/>
+              </a:prstGeom>
+            </p:spPr>
+          </p:pic>
+        </mc:Fallback>
+      </mc:AlternateContent>
+      <mc:AlternateContent xmlns:mc="http://schemas.openxmlformats.org/markup-compatibility/2006">
+        <mc:Choice xmlns:p14="http://schemas.microsoft.com/office/powerpoint/2010/main" Requires="p14">
+          <p:contentPart p14:bwMode="auto" r:id="rId4">
+            <p14:nvContentPartPr>
+              <p14:cNvPr id="5" name="Ink 4">
+                <a:extLst>
+                  <a:ext uri="{FF2B5EF4-FFF2-40B4-BE49-F238E27FC236}">
+                    <a16:creationId xmlns:a16="http://schemas.microsoft.com/office/drawing/2014/main" id="{9EDA09C9-B5ED-4EEF-AA35-388D95913D80}"/>
+                  </a:ext>
+                </a:extLst>
+              </p14:cNvPr>
+              <p14:cNvContentPartPr/>
+              <p14:nvPr/>
+            </p14:nvContentPartPr>
+            <p14:xfrm>
+              <a:off x="2146249" y="1730119"/>
+              <a:ext cx="485280" cy="29160"/>
+            </p14:xfrm>
+          </p:contentPart>
+        </mc:Choice>
+        <mc:Fallback>
+          <p:pic>
+            <p:nvPicPr>
+              <p:cNvPr id="5" name="Ink 4">
+                <a:extLst>
+                  <a:ext uri="{FF2B5EF4-FFF2-40B4-BE49-F238E27FC236}">
+                    <a16:creationId xmlns:a16="http://schemas.microsoft.com/office/drawing/2014/main" id="{9EDA09C9-B5ED-4EEF-AA35-388D95913D80}"/>
+                  </a:ext>
+                </a:extLst>
+              </p:cNvPr>
+              <p:cNvPicPr/>
+              <p:nvPr/>
+            </p:nvPicPr>
+            <p:blipFill>
+              <a:blip r:embed="rId5"/>
+              <a:stretch>
+                <a:fillRect/>
+              </a:stretch>
+            </p:blipFill>
+            <p:spPr>
+              <a:xfrm>
+                <a:off x="2137249" y="1721479"/>
+                <a:ext cx="502920" cy="46800"/>
+              </a:xfrm>
+              <a:prstGeom prst="rect">
+                <a:avLst/>
+              </a:prstGeom>
+            </p:spPr>
+          </p:pic>
+        </mc:Fallback>
+      </mc:AlternateContent>
+      <mc:AlternateContent xmlns:mc="http://schemas.openxmlformats.org/markup-compatibility/2006">
+        <mc:Choice xmlns:p14="http://schemas.microsoft.com/office/powerpoint/2010/main" Requires="p14">
+          <p:contentPart p14:bwMode="auto" r:id="rId6">
+            <p14:nvContentPartPr>
+              <p14:cNvPr id="6" name="Ink 5">
+                <a:extLst>
+                  <a:ext uri="{FF2B5EF4-FFF2-40B4-BE49-F238E27FC236}">
+                    <a16:creationId xmlns:a16="http://schemas.microsoft.com/office/drawing/2014/main" id="{CB7B0A85-C205-46BE-A892-CFBC470DD6FA}"/>
+                  </a:ext>
+                </a:extLst>
+              </p14:cNvPr>
+              <p14:cNvContentPartPr/>
+              <p14:nvPr/>
+            </p14:nvContentPartPr>
+            <p14:xfrm>
+              <a:off x="870049" y="2176159"/>
+              <a:ext cx="817560" cy="35640"/>
+            </p14:xfrm>
+          </p:contentPart>
+        </mc:Choice>
+        <mc:Fallback>
+          <p:pic>
+            <p:nvPicPr>
+              <p:cNvPr id="6" name="Ink 5">
+                <a:extLst>
+                  <a:ext uri="{FF2B5EF4-FFF2-40B4-BE49-F238E27FC236}">
+                    <a16:creationId xmlns:a16="http://schemas.microsoft.com/office/drawing/2014/main" id="{CB7B0A85-C205-46BE-A892-CFBC470DD6FA}"/>
+                  </a:ext>
+                </a:extLst>
+              </p:cNvPr>
+              <p:cNvPicPr/>
+              <p:nvPr/>
+            </p:nvPicPr>
+            <p:blipFill>
+              <a:blip r:embed="rId7"/>
+              <a:stretch>
+                <a:fillRect/>
+              </a:stretch>
+            </p:blipFill>
+            <p:spPr>
+              <a:xfrm>
+                <a:off x="861409" y="2167159"/>
+                <a:ext cx="835200" cy="53280"/>
+              </a:xfrm>
+              <a:prstGeom prst="rect">
+                <a:avLst/>
+              </a:prstGeom>
+            </p:spPr>
+          </p:pic>
+        </mc:Fallback>
+      </mc:AlternateContent>
+      <mc:AlternateContent xmlns:mc="http://schemas.openxmlformats.org/markup-compatibility/2006">
+        <mc:Choice xmlns:p14="http://schemas.microsoft.com/office/powerpoint/2010/main" Requires="p14">
+          <p:contentPart p14:bwMode="auto" r:id="rId8">
+            <p14:nvContentPartPr>
+              <p14:cNvPr id="7" name="Ink 6">
+                <a:extLst>
+                  <a:ext uri="{FF2B5EF4-FFF2-40B4-BE49-F238E27FC236}">
+                    <a16:creationId xmlns:a16="http://schemas.microsoft.com/office/drawing/2014/main" id="{17BF5C55-88D2-4343-9EE2-B7469FBAE8AB}"/>
+                  </a:ext>
+                </a:extLst>
+              </p14:cNvPr>
+              <p14:cNvContentPartPr/>
+              <p14:nvPr/>
+            </p14:nvContentPartPr>
+            <p14:xfrm>
+              <a:off x="3212929" y="2156719"/>
+              <a:ext cx="611640" cy="34920"/>
+            </p14:xfrm>
+          </p:contentPart>
+        </mc:Choice>
+        <mc:Fallback>
+          <p:pic>
+            <p:nvPicPr>
+              <p:cNvPr id="7" name="Ink 6">
+                <a:extLst>
+                  <a:ext uri="{FF2B5EF4-FFF2-40B4-BE49-F238E27FC236}">
+                    <a16:creationId xmlns:a16="http://schemas.microsoft.com/office/drawing/2014/main" id="{17BF5C55-88D2-4343-9EE2-B7469FBAE8AB}"/>
+                  </a:ext>
+                </a:extLst>
+              </p:cNvPr>
+              <p:cNvPicPr/>
+              <p:nvPr/>
+            </p:nvPicPr>
+            <p:blipFill>
+              <a:blip r:embed="rId9"/>
+              <a:stretch>
+                <a:fillRect/>
+              </a:stretch>
+            </p:blipFill>
+            <p:spPr>
+              <a:xfrm>
+                <a:off x="3204289" y="2147719"/>
+                <a:ext cx="629280" cy="52560"/>
+              </a:xfrm>
+              <a:prstGeom prst="rect">
+                <a:avLst/>
+              </a:prstGeom>
+            </p:spPr>
+          </p:pic>
+        </mc:Fallback>
+      </mc:AlternateContent>
+      <mc:AlternateContent xmlns:mc="http://schemas.openxmlformats.org/markup-compatibility/2006">
+        <mc:Choice xmlns:p14="http://schemas.microsoft.com/office/powerpoint/2010/main" Requires="p14">
+          <p:contentPart p14:bwMode="auto" r:id="rId10">
+            <p14:nvContentPartPr>
+              <p14:cNvPr id="8" name="Ink 7">
+                <a:extLst>
+                  <a:ext uri="{FF2B5EF4-FFF2-40B4-BE49-F238E27FC236}">
+                    <a16:creationId xmlns:a16="http://schemas.microsoft.com/office/drawing/2014/main" id="{07F4CE8C-0EAA-4286-ABB9-604A16CF5DDD}"/>
+                  </a:ext>
+                </a:extLst>
+              </p14:cNvPr>
+              <p14:cNvContentPartPr/>
+              <p14:nvPr/>
+            </p14:nvContentPartPr>
+            <p14:xfrm>
+              <a:off x="829009" y="2541919"/>
+              <a:ext cx="512640" cy="63720"/>
+            </p14:xfrm>
+          </p:contentPart>
+        </mc:Choice>
+        <mc:Fallback>
+          <p:pic>
+            <p:nvPicPr>
+              <p:cNvPr id="8" name="Ink 7">
+                <a:extLst>
+                  <a:ext uri="{FF2B5EF4-FFF2-40B4-BE49-F238E27FC236}">
+                    <a16:creationId xmlns:a16="http://schemas.microsoft.com/office/drawing/2014/main" id="{07F4CE8C-0EAA-4286-ABB9-604A16CF5DDD}"/>
+                  </a:ext>
+                </a:extLst>
+              </p:cNvPr>
+              <p:cNvPicPr/>
+              <p:nvPr/>
+            </p:nvPicPr>
+            <p:blipFill>
+              <a:blip r:embed="rId11"/>
+              <a:stretch>
+                <a:fillRect/>
+              </a:stretch>
+            </p:blipFill>
+            <p:spPr>
+              <a:xfrm>
+                <a:off x="820369" y="2532919"/>
+                <a:ext cx="530280" cy="81360"/>
+              </a:xfrm>
+              <a:prstGeom prst="rect">
+                <a:avLst/>
+              </a:prstGeom>
+            </p:spPr>
+          </p:pic>
+        </mc:Fallback>
+      </mc:AlternateContent>
+      <mc:AlternateContent xmlns:mc="http://schemas.openxmlformats.org/markup-compatibility/2006">
+        <mc:Choice xmlns:p14="http://schemas.microsoft.com/office/powerpoint/2010/main" Requires="p14">
+          <p:contentPart p14:bwMode="auto" r:id="rId12">
+            <p14:nvContentPartPr>
+              <p14:cNvPr id="9" name="Ink 8">
+                <a:extLst>
+                  <a:ext uri="{FF2B5EF4-FFF2-40B4-BE49-F238E27FC236}">
+                    <a16:creationId xmlns:a16="http://schemas.microsoft.com/office/drawing/2014/main" id="{237ED9CA-25F1-4713-BC98-5DF1E719C3CC}"/>
+                  </a:ext>
+                </a:extLst>
+              </p14:cNvPr>
+              <p14:cNvContentPartPr/>
+              <p14:nvPr/>
+            </p14:nvContentPartPr>
+            <p14:xfrm>
+              <a:off x="3256489" y="2588359"/>
+              <a:ext cx="823680" cy="29880"/>
+            </p14:xfrm>
+          </p:contentPart>
+        </mc:Choice>
+        <mc:Fallback>
+          <p:pic>
+            <p:nvPicPr>
+              <p:cNvPr id="9" name="Ink 8">
+                <a:extLst>
+                  <a:ext uri="{FF2B5EF4-FFF2-40B4-BE49-F238E27FC236}">
+                    <a16:creationId xmlns:a16="http://schemas.microsoft.com/office/drawing/2014/main" id="{237ED9CA-25F1-4713-BC98-5DF1E719C3CC}"/>
+                  </a:ext>
+                </a:extLst>
+              </p:cNvPr>
+              <p:cNvPicPr/>
+              <p:nvPr/>
+            </p:nvPicPr>
+            <p:blipFill>
+              <a:blip r:embed="rId13"/>
+              <a:stretch>
+                <a:fillRect/>
+              </a:stretch>
+            </p:blipFill>
+            <p:spPr>
+              <a:xfrm>
+                <a:off x="3247849" y="2579359"/>
+                <a:ext cx="841320" cy="47520"/>
+              </a:xfrm>
+              <a:prstGeom prst="rect">
+                <a:avLst/>
+              </a:prstGeom>
+            </p:spPr>
+          </p:pic>
+        </mc:Fallback>
+      </mc:AlternateContent>
     </p:spTree>
     <p:extLst>
       <p:ext uri="{BB962C8B-B14F-4D97-AF65-F5344CB8AC3E}">
@@ -4363,6 +4957,159 @@
           </a:p>
         </p:txBody>
       </p:sp>
+      <mc:AlternateContent xmlns:mc="http://schemas.openxmlformats.org/markup-compatibility/2006">
+        <mc:Choice xmlns:p14="http://schemas.microsoft.com/office/powerpoint/2010/main" Requires="p14">
+          <p:contentPart p14:bwMode="auto" r:id="rId2">
+            <p14:nvContentPartPr>
+              <p14:cNvPr id="4" name="Ink 3">
+                <a:extLst>
+                  <a:ext uri="{FF2B5EF4-FFF2-40B4-BE49-F238E27FC236}">
+                    <a16:creationId xmlns:a16="http://schemas.microsoft.com/office/drawing/2014/main" id="{B75E9A83-CFD2-4B0E-9C75-A2CA4218F1EB}"/>
+                  </a:ext>
+                </a:extLst>
+              </p14:cNvPr>
+              <p14:cNvContentPartPr/>
+              <p14:nvPr/>
+            </p14:nvContentPartPr>
+            <p14:xfrm>
+              <a:off x="548569" y="1506199"/>
+              <a:ext cx="223200" cy="93600"/>
+            </p14:xfrm>
+          </p:contentPart>
+        </mc:Choice>
+        <mc:Fallback>
+          <p:pic>
+            <p:nvPicPr>
+              <p:cNvPr id="4" name="Ink 3">
+                <a:extLst>
+                  <a:ext uri="{FF2B5EF4-FFF2-40B4-BE49-F238E27FC236}">
+                    <a16:creationId xmlns:a16="http://schemas.microsoft.com/office/drawing/2014/main" id="{B75E9A83-CFD2-4B0E-9C75-A2CA4218F1EB}"/>
+                  </a:ext>
+                </a:extLst>
+              </p:cNvPr>
+              <p:cNvPicPr/>
+              <p:nvPr/>
+            </p:nvPicPr>
+            <p:blipFill>
+              <a:blip r:embed="rId3"/>
+              <a:stretch>
+                <a:fillRect/>
+              </a:stretch>
+            </p:blipFill>
+            <p:spPr>
+              <a:xfrm>
+                <a:off x="539929" y="1497559"/>
+                <a:ext cx="240840" cy="111240"/>
+              </a:xfrm>
+              <a:prstGeom prst="rect">
+                <a:avLst/>
+              </a:prstGeom>
+            </p:spPr>
+          </p:pic>
+        </mc:Fallback>
+      </mc:AlternateContent>
+      <mc:AlternateContent xmlns:mc="http://schemas.openxmlformats.org/markup-compatibility/2006">
+        <mc:Choice xmlns:p14="http://schemas.microsoft.com/office/powerpoint/2010/main" Requires="p14">
+          <p:contentPart p14:bwMode="auto" r:id="rId4">
+            <p14:nvContentPartPr>
+              <p14:cNvPr id="5" name="Ink 4">
+                <a:extLst>
+                  <a:ext uri="{FF2B5EF4-FFF2-40B4-BE49-F238E27FC236}">
+                    <a16:creationId xmlns:a16="http://schemas.microsoft.com/office/drawing/2014/main" id="{D841D165-C451-4C8A-8D7E-C18CC51C3635}"/>
+                  </a:ext>
+                </a:extLst>
+              </p14:cNvPr>
+              <p14:cNvContentPartPr/>
+              <p14:nvPr/>
+            </p14:nvContentPartPr>
+            <p14:xfrm>
+              <a:off x="618049" y="2000119"/>
+              <a:ext cx="162000" cy="137520"/>
+            </p14:xfrm>
+          </p:contentPart>
+        </mc:Choice>
+        <mc:Fallback>
+          <p:pic>
+            <p:nvPicPr>
+              <p:cNvPr id="5" name="Ink 4">
+                <a:extLst>
+                  <a:ext uri="{FF2B5EF4-FFF2-40B4-BE49-F238E27FC236}">
+                    <a16:creationId xmlns:a16="http://schemas.microsoft.com/office/drawing/2014/main" id="{D841D165-C451-4C8A-8D7E-C18CC51C3635}"/>
+                  </a:ext>
+                </a:extLst>
+              </p:cNvPr>
+              <p:cNvPicPr/>
+              <p:nvPr/>
+            </p:nvPicPr>
+            <p:blipFill>
+              <a:blip r:embed="rId5"/>
+              <a:stretch>
+                <a:fillRect/>
+              </a:stretch>
+            </p:blipFill>
+            <p:spPr>
+              <a:xfrm>
+                <a:off x="609409" y="1991479"/>
+                <a:ext cx="179640" cy="155160"/>
+              </a:xfrm>
+              <a:prstGeom prst="rect">
+                <a:avLst/>
+              </a:prstGeom>
+            </p:spPr>
+          </p:pic>
+        </mc:Fallback>
+      </mc:AlternateContent>
+      <mc:AlternateContent xmlns:mc="http://schemas.openxmlformats.org/markup-compatibility/2006">
+        <mc:Choice xmlns:p14="http://schemas.microsoft.com/office/powerpoint/2010/main" Requires="p14">
+          <p:contentPart p14:bwMode="auto" r:id="rId6">
+            <p14:nvContentPartPr>
+              <p14:cNvPr id="6" name="Ink 5">
+                <a:extLst>
+                  <a:ext uri="{FF2B5EF4-FFF2-40B4-BE49-F238E27FC236}">
+                    <a16:creationId xmlns:a16="http://schemas.microsoft.com/office/drawing/2014/main" id="{5FA3032D-D815-4FDE-BA6A-730E2D6F36EB}"/>
+                  </a:ext>
+                </a:extLst>
+              </p14:cNvPr>
+              <p14:cNvContentPartPr/>
+              <p14:nvPr/>
+            </p14:nvContentPartPr>
+            <p14:xfrm>
+              <a:off x="572329" y="2395759"/>
+              <a:ext cx="169920" cy="96120"/>
+            </p14:xfrm>
+          </p:contentPart>
+        </mc:Choice>
+        <mc:Fallback>
+          <p:pic>
+            <p:nvPicPr>
+              <p:cNvPr id="6" name="Ink 5">
+                <a:extLst>
+                  <a:ext uri="{FF2B5EF4-FFF2-40B4-BE49-F238E27FC236}">
+                    <a16:creationId xmlns:a16="http://schemas.microsoft.com/office/drawing/2014/main" id="{5FA3032D-D815-4FDE-BA6A-730E2D6F36EB}"/>
+                  </a:ext>
+                </a:extLst>
+              </p:cNvPr>
+              <p:cNvPicPr/>
+              <p:nvPr/>
+            </p:nvPicPr>
+            <p:blipFill>
+              <a:blip r:embed="rId7"/>
+              <a:stretch>
+                <a:fillRect/>
+              </a:stretch>
+            </p:blipFill>
+            <p:spPr>
+              <a:xfrm>
+                <a:off x="563689" y="2386759"/>
+                <a:ext cx="187560" cy="113760"/>
+              </a:xfrm>
+              <a:prstGeom prst="rect">
+                <a:avLst/>
+              </a:prstGeom>
+            </p:spPr>
+          </p:pic>
+        </mc:Fallback>
+      </mc:AlternateContent>
     </p:spTree>
     <p:extLst>
       <p:ext uri="{BB962C8B-B14F-4D97-AF65-F5344CB8AC3E}">

</xml_diff>